<commit_message>
Changed the sound effects, fixed the leaderboard, modified the presentation
</commit_message>
<xml_diff>
--- a/TypeAttackPresentation.pptx
+++ b/TypeAttackPresentation.pptx
@@ -314,7 +314,7 @@
           <a:p>
             <a:fld id="{ADE257EB-EEB2-4C62-9D71-243A8AB50717}" type="datetimeFigureOut">
               <a:rPr lang="en-US" smtClean="0"/>
-              <a:t>12/20/2016</a:t>
+              <a:t>21-Dec-16</a:t>
             </a:fld>
             <a:endParaRPr lang="en-US"/>
           </a:p>
@@ -484,7 +484,7 @@
           <a:p>
             <a:fld id="{ADE257EB-EEB2-4C62-9D71-243A8AB50717}" type="datetimeFigureOut">
               <a:rPr lang="en-US" smtClean="0"/>
-              <a:t>12/20/2016</a:t>
+              <a:t>21-Dec-16</a:t>
             </a:fld>
             <a:endParaRPr lang="en-US"/>
           </a:p>
@@ -664,7 +664,7 @@
           <a:p>
             <a:fld id="{ADE257EB-EEB2-4C62-9D71-243A8AB50717}" type="datetimeFigureOut">
               <a:rPr lang="en-US" smtClean="0"/>
-              <a:t>12/20/2016</a:t>
+              <a:t>21-Dec-16</a:t>
             </a:fld>
             <a:endParaRPr lang="en-US"/>
           </a:p>
@@ -834,7 +834,7 @@
           <a:p>
             <a:fld id="{ADE257EB-EEB2-4C62-9D71-243A8AB50717}" type="datetimeFigureOut">
               <a:rPr lang="en-US" smtClean="0"/>
-              <a:t>12/20/2016</a:t>
+              <a:t>21-Dec-16</a:t>
             </a:fld>
             <a:endParaRPr lang="en-US"/>
           </a:p>
@@ -1080,7 +1080,7 @@
           <a:p>
             <a:fld id="{ADE257EB-EEB2-4C62-9D71-243A8AB50717}" type="datetimeFigureOut">
               <a:rPr lang="en-US" smtClean="0"/>
-              <a:t>12/20/2016</a:t>
+              <a:t>21-Dec-16</a:t>
             </a:fld>
             <a:endParaRPr lang="en-US"/>
           </a:p>
@@ -1368,7 +1368,7 @@
           <a:p>
             <a:fld id="{ADE257EB-EEB2-4C62-9D71-243A8AB50717}" type="datetimeFigureOut">
               <a:rPr lang="en-US" smtClean="0"/>
-              <a:t>12/20/2016</a:t>
+              <a:t>21-Dec-16</a:t>
             </a:fld>
             <a:endParaRPr lang="en-US"/>
           </a:p>
@@ -1790,7 +1790,7 @@
           <a:p>
             <a:fld id="{ADE257EB-EEB2-4C62-9D71-243A8AB50717}" type="datetimeFigureOut">
               <a:rPr lang="en-US" smtClean="0"/>
-              <a:t>12/20/2016</a:t>
+              <a:t>21-Dec-16</a:t>
             </a:fld>
             <a:endParaRPr lang="en-US"/>
           </a:p>
@@ -1908,7 +1908,7 @@
           <a:p>
             <a:fld id="{ADE257EB-EEB2-4C62-9D71-243A8AB50717}" type="datetimeFigureOut">
               <a:rPr lang="en-US" smtClean="0"/>
-              <a:t>12/20/2016</a:t>
+              <a:t>21-Dec-16</a:t>
             </a:fld>
             <a:endParaRPr lang="en-US"/>
           </a:p>
@@ -2003,7 +2003,7 @@
           <a:p>
             <a:fld id="{ADE257EB-EEB2-4C62-9D71-243A8AB50717}" type="datetimeFigureOut">
               <a:rPr lang="en-US" smtClean="0"/>
-              <a:t>12/20/2016</a:t>
+              <a:t>21-Dec-16</a:t>
             </a:fld>
             <a:endParaRPr lang="en-US"/>
           </a:p>
@@ -2280,7 +2280,7 @@
           <a:p>
             <a:fld id="{ADE257EB-EEB2-4C62-9D71-243A8AB50717}" type="datetimeFigureOut">
               <a:rPr lang="en-US" smtClean="0"/>
-              <a:t>12/20/2016</a:t>
+              <a:t>21-Dec-16</a:t>
             </a:fld>
             <a:endParaRPr lang="en-US"/>
           </a:p>
@@ -2533,7 +2533,7 @@
           <a:p>
             <a:fld id="{ADE257EB-EEB2-4C62-9D71-243A8AB50717}" type="datetimeFigureOut">
               <a:rPr lang="en-US" smtClean="0"/>
-              <a:t>12/20/2016</a:t>
+              <a:t>21-Dec-16</a:t>
             </a:fld>
             <a:endParaRPr lang="en-US"/>
           </a:p>
@@ -2755,7 +2755,7 @@
           <a:p>
             <a:fld id="{ADE257EB-EEB2-4C62-9D71-243A8AB50717}" type="datetimeFigureOut">
               <a:rPr lang="en-US" smtClean="0"/>
-              <a:t>12/20/2016</a:t>
+              <a:t>21-Dec-16</a:t>
             </a:fld>
             <a:endParaRPr lang="en-US"/>
           </a:p>
@@ -3903,7 +3903,7 @@
         <p:spPr>
           <a:xfrm>
             <a:off x="914400" y="681487"/>
-            <a:ext cx="7467600" cy="5570756"/>
+            <a:ext cx="7467600" cy="5909310"/>
           </a:xfrm>
           <a:prstGeom prst="rect">
             <a:avLst/>
@@ -3981,7 +3981,15 @@
                   <a:schemeClr val="bg1"/>
                 </a:solidFill>
               </a:rPr>
-              <a:t> API</a:t>
+              <a:t> </a:t>
+            </a:r>
+            <a:r>
+              <a:rPr lang="en-US" sz="2400" dirty="0" smtClean="0">
+                <a:solidFill>
+                  <a:schemeClr val="bg1"/>
+                </a:solidFill>
+              </a:rPr>
+              <a:t>API</a:t>
             </a:r>
           </a:p>
           <a:p>
@@ -3989,6 +3997,14 @@
               <a:buFont typeface="Arial" pitchFamily="34" charset="0"/>
               <a:buChar char="•"/>
             </a:pPr>
+            <a:r>
+              <a:rPr lang="en-US" sz="2400" dirty="0" smtClean="0">
+                <a:solidFill>
+                  <a:schemeClr val="bg1"/>
+                </a:solidFill>
+              </a:rPr>
+              <a:t>Implemented the word effects</a:t>
+            </a:r>
             <a:endParaRPr lang="en-US" sz="2400" dirty="0" smtClean="0">
               <a:solidFill>
                 <a:schemeClr val="bg1"/>
@@ -3996,10 +4012,6 @@
             </a:endParaRPr>
           </a:p>
           <a:p>
-            <a:pPr marL="285750" indent="-285750">
-              <a:buFont typeface="Arial" pitchFamily="34" charset="0"/>
-              <a:buChar char="•"/>
-            </a:pPr>
             <a:endParaRPr lang="en-US" sz="2400" dirty="0">
               <a:solidFill>
                 <a:schemeClr val="bg1"/>
@@ -4007,28 +4019,100 @@
             </a:endParaRPr>
           </a:p>
           <a:p>
-            <a:endParaRPr lang="en-US" sz="2400" dirty="0">
-              <a:solidFill>
-                <a:schemeClr val="bg1"/>
-              </a:solidFill>
-            </a:endParaRPr>
-          </a:p>
-          <a:p>
             <a:r>
               <a:rPr lang="en-US" sz="2400" dirty="0" smtClean="0">
                 <a:solidFill>
                   <a:schemeClr val="bg1"/>
                 </a:solidFill>
               </a:rPr>
-              <a:t>After he received an interdiction to write a single line of code, </a:t>
-            </a:r>
-            <a:r>
-              <a:rPr lang="en-US" sz="2400" b="1" dirty="0" err="1" smtClean="0">
+              <a:t>After he received an interdiction to write a single line of </a:t>
+            </a:r>
+            <a:r>
+              <a:rPr lang="en-US" sz="2400" dirty="0" smtClean="0">
+                <a:solidFill>
+                  <a:schemeClr val="bg1"/>
+                </a:solidFill>
+              </a:rPr>
+              <a:t>code, </a:t>
+            </a:r>
+            <a:r>
+              <a:rPr lang="en-US" sz="2400" b="1" dirty="0" smtClean="0">
                 <a:solidFill>
                   <a:srgbClr val="FF0000"/>
                 </a:solidFill>
               </a:rPr>
-              <a:t>Vlad</a:t>
+              <a:t>Adelina</a:t>
+            </a:r>
+            <a:r>
+              <a:rPr lang="en-US" sz="2400" b="1" dirty="0">
+                <a:solidFill>
+                  <a:srgbClr val="FF0000"/>
+                </a:solidFill>
+              </a:rPr>
+              <a:t>:</a:t>
+            </a:r>
+          </a:p>
+          <a:p>
+            <a:endParaRPr lang="en-US" sz="2400" b="1" dirty="0">
+              <a:solidFill>
+                <a:srgbClr val="FF0000"/>
+              </a:solidFill>
+            </a:endParaRPr>
+          </a:p>
+          <a:p>
+            <a:pPr marL="342900" indent="-342900">
+              <a:buFont typeface="Arial" pitchFamily="34" charset="0"/>
+              <a:buChar char="•"/>
+            </a:pPr>
+            <a:r>
+              <a:rPr lang="en-US" sz="2400" dirty="0">
+                <a:solidFill>
+                  <a:schemeClr val="bg1"/>
+                </a:solidFill>
+              </a:rPr>
+              <a:t>Implemented the score logic</a:t>
+            </a:r>
+          </a:p>
+          <a:p>
+            <a:pPr marL="342900" indent="-342900">
+              <a:buFont typeface="Arial" pitchFamily="34" charset="0"/>
+              <a:buChar char="•"/>
+            </a:pPr>
+            <a:r>
+              <a:rPr lang="en-US" sz="2400" dirty="0">
+                <a:solidFill>
+                  <a:schemeClr val="bg1"/>
+                </a:solidFill>
+              </a:rPr>
+              <a:t>Added the logic for the loss of lives when the time is over</a:t>
+            </a:r>
+          </a:p>
+          <a:p>
+            <a:pPr marL="342900" indent="-342900">
+              <a:buFont typeface="Arial" pitchFamily="34" charset="0"/>
+              <a:buChar char="•"/>
+            </a:pPr>
+            <a:r>
+              <a:rPr lang="en-US" sz="2400" dirty="0">
+                <a:solidFill>
+                  <a:schemeClr val="bg1"/>
+                </a:solidFill>
+              </a:rPr>
+              <a:t>Fixed bugs</a:t>
+            </a:r>
+          </a:p>
+          <a:p>
+            <a:pPr marL="342900" indent="-342900">
+              <a:buFont typeface="Arial" pitchFamily="34" charset="0"/>
+              <a:buChar char="•"/>
+            </a:pPr>
+            <a:r>
+              <a:rPr lang="en-US" sz="2400" dirty="0">
+                <a:solidFill>
+                  <a:schemeClr val="bg1"/>
+                </a:solidFill>
+              </a:rPr>
+              <a:t>The PowerPoint </a:t>
             </a:r>
             <a:r>
               <a:rPr lang="en-US" sz="2400" dirty="0" smtClean="0">
@@ -4036,43 +4120,9 @@
                   <a:schemeClr val="bg1"/>
                 </a:solidFill>
               </a:rPr>
-              <a:t>:</a:t>
-            </a:r>
-          </a:p>
-          <a:p>
-            <a:pPr marL="342900" indent="-342900">
-              <a:buFont typeface="Arial" pitchFamily="34" charset="0"/>
-              <a:buChar char="•"/>
-            </a:pPr>
+              <a:t>presentation</a:t>
+            </a:r>
             <a:endParaRPr lang="en-US" sz="2400" dirty="0" smtClean="0">
-              <a:solidFill>
-                <a:schemeClr val="bg1"/>
-              </a:solidFill>
-            </a:endParaRPr>
-          </a:p>
-          <a:p>
-            <a:endParaRPr lang="en-US" sz="2000" b="1" dirty="0" smtClean="0">
-              <a:solidFill>
-                <a:schemeClr val="bg1"/>
-              </a:solidFill>
-            </a:endParaRPr>
-          </a:p>
-          <a:p>
-            <a:endParaRPr lang="en-US" dirty="0" smtClean="0">
-              <a:solidFill>
-                <a:schemeClr val="bg1"/>
-              </a:solidFill>
-            </a:endParaRPr>
-          </a:p>
-          <a:p>
-            <a:endParaRPr lang="en-US" dirty="0">
-              <a:solidFill>
-                <a:schemeClr val="bg1"/>
-              </a:solidFill>
-            </a:endParaRPr>
-          </a:p>
-          <a:p>
-            <a:endParaRPr lang="en-US" dirty="0">
               <a:solidFill>
                 <a:schemeClr val="bg1"/>
               </a:solidFill>
@@ -4125,8 +4175,8 @@
         </p:nvSpPr>
         <p:spPr>
           <a:xfrm>
-            <a:off x="703053" y="457200"/>
-            <a:ext cx="7983747" cy="4524315"/>
+            <a:off x="1219200" y="1295400"/>
+            <a:ext cx="7086600" cy="3785652"/>
           </a:xfrm>
           <a:prstGeom prst="rect">
             <a:avLst/>
@@ -4140,31 +4190,39 @@
           <a:lstStyle/>
           <a:p>
             <a:r>
-              <a:rPr lang="en-US" sz="2400" b="1" dirty="0" err="1" smtClean="0">
+              <a:rPr lang="en-US" sz="2400" b="1" dirty="0" smtClean="0">
                 <a:solidFill>
                   <a:srgbClr val="FF0000"/>
                 </a:solidFill>
               </a:rPr>
-              <a:t>Adelina</a:t>
-            </a:r>
-            <a:r>
-              <a:rPr lang="en-US" sz="2400" b="1" dirty="0">
+              <a:t>Vlad</a:t>
+            </a:r>
+            <a:r>
+              <a:rPr lang="en-US" sz="2400" b="1" dirty="0" smtClean="0">
+                <a:solidFill>
+                  <a:schemeClr val="bg1"/>
+                </a:solidFill>
+              </a:rPr>
+              <a:t>:</a:t>
+            </a:r>
+            <a:r>
+              <a:rPr lang="en-US" sz="2400" b="1" dirty="0" smtClean="0">
                 <a:solidFill>
                   <a:srgbClr val="FF0000"/>
                 </a:solidFill>
               </a:rPr>
-              <a:t>:</a:t>
-            </a:r>
-            <a:endParaRPr lang="en-US" sz="2400" b="1" dirty="0" smtClean="0">
+              <a:t> </a:t>
+            </a:r>
+            <a:endParaRPr lang="en-US" sz="2400" b="1" dirty="0">
               <a:solidFill>
                 <a:srgbClr val="FF0000"/>
               </a:solidFill>
             </a:endParaRPr>
           </a:p>
           <a:p>
-            <a:endParaRPr lang="en-US" sz="2400" b="1" dirty="0">
-              <a:solidFill>
-                <a:srgbClr val="FF0000"/>
+            <a:endParaRPr lang="en-US" sz="2400" dirty="0">
+              <a:solidFill>
+                <a:schemeClr val="bg1"/>
               </a:solidFill>
             </a:endParaRPr>
           </a:p>
@@ -4174,12 +4232,12 @@
               <a:buChar char="•"/>
             </a:pPr>
             <a:r>
-              <a:rPr lang="en-US" sz="2400" dirty="0" smtClean="0">
-                <a:solidFill>
-                  <a:schemeClr val="bg1"/>
-                </a:solidFill>
-              </a:rPr>
-              <a:t>Implemented the score logic</a:t>
+              <a:rPr lang="en-US" sz="2400" dirty="0">
+                <a:solidFill>
+                  <a:schemeClr val="bg1"/>
+                </a:solidFill>
+              </a:rPr>
+              <a:t>Completed the leaderboard functionality</a:t>
             </a:r>
           </a:p>
           <a:p>
@@ -4188,12 +4246,12 @@
               <a:buChar char="•"/>
             </a:pPr>
             <a:r>
-              <a:rPr lang="en-US" sz="2400" dirty="0" smtClean="0">
-                <a:solidFill>
-                  <a:schemeClr val="bg1"/>
-                </a:solidFill>
-              </a:rPr>
-              <a:t>Added the logic for the loss of lives when the time is over</a:t>
+              <a:rPr lang="en-US" sz="2400" dirty="0">
+                <a:solidFill>
+                  <a:schemeClr val="bg1"/>
+                </a:solidFill>
+              </a:rPr>
+              <a:t>Set the sound effects</a:t>
             </a:r>
           </a:p>
           <a:p>
@@ -4202,44 +4260,15 @@
               <a:buChar char="•"/>
             </a:pPr>
             <a:r>
-              <a:rPr lang="en-US" sz="2400" dirty="0" smtClean="0">
-                <a:solidFill>
-                  <a:schemeClr val="bg1"/>
-                </a:solidFill>
-              </a:rPr>
-              <a:t>Fixed bugs</a:t>
-            </a:r>
-          </a:p>
-          <a:p>
-            <a:pPr marL="342900" indent="-342900">
-              <a:buFont typeface="Arial" pitchFamily="34" charset="0"/>
-              <a:buChar char="•"/>
-            </a:pPr>
-            <a:r>
-              <a:rPr lang="en-US" sz="2400" dirty="0" smtClean="0">
-                <a:solidFill>
-                  <a:schemeClr val="bg1"/>
-                </a:solidFill>
-              </a:rPr>
-              <a:t>The PowerPoint presentation</a:t>
-            </a:r>
-          </a:p>
-          <a:p>
-            <a:pPr marL="342900" indent="-342900">
-              <a:buFont typeface="Arial" pitchFamily="34" charset="0"/>
-              <a:buChar char="•"/>
-            </a:pPr>
-            <a:endParaRPr lang="en-US" sz="2400" dirty="0">
-              <a:solidFill>
-                <a:schemeClr val="bg1"/>
-              </a:solidFill>
-            </a:endParaRPr>
-          </a:p>
-          <a:p>
-            <a:pPr marL="342900" indent="-342900">
-              <a:buFont typeface="Arial" pitchFamily="34" charset="0"/>
-              <a:buChar char="•"/>
-            </a:pPr>
+              <a:rPr lang="en-US" sz="2400" dirty="0">
+                <a:solidFill>
+                  <a:schemeClr val="bg1"/>
+                </a:solidFill>
+              </a:rPr>
+              <a:t>Fixed some minor bugs</a:t>
+            </a:r>
+          </a:p>
+          <a:p>
             <a:endParaRPr lang="en-US" sz="2400" dirty="0" smtClean="0">
               <a:solidFill>
                 <a:schemeClr val="bg1"/>
@@ -4360,8 +4389,8 @@
         </p:nvSpPr>
         <p:spPr>
           <a:xfrm>
-            <a:off x="685800" y="228600"/>
-            <a:ext cx="6781800" cy="6001643"/>
+            <a:off x="1295400" y="1066800"/>
+            <a:ext cx="6781800" cy="4893647"/>
           </a:xfrm>
           <a:prstGeom prst="rect">
             <a:avLst/>
@@ -4414,15 +4443,21 @@
                   <a:schemeClr val="bg1"/>
                 </a:solidFill>
               </a:rPr>
-              <a:t>Tested the </a:t>
-            </a:r>
+              <a:t>Tested the game</a:t>
+            </a:r>
+          </a:p>
+          <a:p>
+            <a:pPr marL="285750" indent="-285750" algn="just">
+              <a:buFont typeface="Arial" pitchFamily="34" charset="0"/>
+              <a:buChar char="•"/>
+            </a:pPr>
             <a:r>
               <a:rPr lang="en-US" sz="2400" dirty="0" smtClean="0">
                 <a:solidFill>
                   <a:schemeClr val="bg1"/>
                 </a:solidFill>
               </a:rPr>
-              <a:t>game</a:t>
+              <a:t>Reported bugs</a:t>
             </a:r>
           </a:p>
           <a:p>
@@ -4431,18 +4466,21 @@
               <a:buChar char="•"/>
             </a:pPr>
             <a:r>
+              <a:rPr lang="en-US" sz="2400" dirty="0">
+                <a:solidFill>
+                  <a:schemeClr val="bg1"/>
+                </a:solidFill>
+              </a:rPr>
+              <a:t>C</a:t>
+            </a:r>
+            <a:r>
               <a:rPr lang="en-US" sz="2400" dirty="0" smtClean="0">
                 <a:solidFill>
                   <a:schemeClr val="bg1"/>
                 </a:solidFill>
               </a:rPr>
-              <a:t>Reported bugs</a:t>
-            </a:r>
-            <a:endParaRPr lang="en-US" sz="2400" dirty="0" smtClean="0">
-              <a:solidFill>
-                <a:schemeClr val="bg1"/>
-              </a:solidFill>
-            </a:endParaRPr>
+              <a:t>reated the diagram</a:t>
+            </a:r>
           </a:p>
           <a:p>
             <a:pPr marL="285750" indent="-285750" algn="just">
@@ -4455,7 +4493,7 @@
                   <a:schemeClr val="bg1"/>
                 </a:solidFill>
               </a:rPr>
-              <a:t>C</a:t>
+              <a:t>W</a:t>
             </a:r>
             <a:r>
               <a:rPr lang="en-US" sz="2400" dirty="0" smtClean="0">
@@ -4463,7 +4501,7 @@
                   <a:schemeClr val="bg1"/>
                 </a:solidFill>
               </a:rPr>
-              <a:t>reated the diagram</a:t>
+              <a:t>rote the technical documentation</a:t>
             </a:r>
           </a:p>
           <a:p>
@@ -4485,42 +4523,8 @@
                   <a:schemeClr val="bg1"/>
                 </a:solidFill>
               </a:rPr>
-              <a:t>rote the technical documentation</a:t>
-            </a:r>
-          </a:p>
-          <a:p>
-            <a:pPr marL="285750" indent="-285750" algn="just">
-              <a:buFont typeface="Arial" pitchFamily="34" charset="0"/>
-              <a:buChar char="•"/>
-            </a:pPr>
-            <a:r>
-              <a:rPr lang="en-US" sz="2400" dirty="0">
-                <a:solidFill>
-                  <a:schemeClr val="bg1"/>
-                </a:solidFill>
-              </a:rPr>
-              <a:t>W</a:t>
-            </a:r>
-            <a:r>
-              <a:rPr lang="en-US" sz="2400" dirty="0" smtClean="0">
-                <a:solidFill>
-                  <a:schemeClr val="bg1"/>
-                </a:solidFill>
-              </a:rPr>
               <a:t>rote the user documentation (how to play)</a:t>
             </a:r>
-          </a:p>
-          <a:p>
-            <a:pPr algn="just"/>
-            <a:endParaRPr lang="en-US" sz="2400" dirty="0" smtClean="0"/>
-          </a:p>
-          <a:p>
-            <a:pPr algn="just"/>
-            <a:endParaRPr lang="en-US" sz="2400" dirty="0"/>
-          </a:p>
-          <a:p>
-            <a:pPr algn="just"/>
-            <a:endParaRPr lang="en-US" sz="2400" dirty="0" smtClean="0"/>
           </a:p>
           <a:p>
             <a:pPr algn="just"/>

</xml_diff>